<commit_message>
Update feature extraction presentation
</commit_message>
<xml_diff>
--- a/presentations/FeatureExtraction.pptx
+++ b/presentations/FeatureExtraction.pptx
@@ -298,7 +298,7 @@
           <a:p>
             <a:fld id="{F2853615-BFDE-46DE-814C-47EC6EF6D371}" type="datetimeFigureOut">
               <a:rPr lang="el-GR" smtClean="0"/>
-              <a:t>24/9/2018</a:t>
+              <a:t>12/10/2018</a:t>
             </a:fld>
             <a:endParaRPr lang="el-GR"/>
           </a:p>
@@ -498,7 +498,7 @@
           <a:p>
             <a:fld id="{F2853615-BFDE-46DE-814C-47EC6EF6D371}" type="datetimeFigureOut">
               <a:rPr lang="el-GR" smtClean="0"/>
-              <a:t>24/9/2018</a:t>
+              <a:t>12/10/2018</a:t>
             </a:fld>
             <a:endParaRPr lang="el-GR"/>
           </a:p>
@@ -673,7 +673,7 @@
           <a:p>
             <a:fld id="{F2853615-BFDE-46DE-814C-47EC6EF6D371}" type="datetimeFigureOut">
               <a:rPr lang="el-GR" smtClean="0"/>
-              <a:t>24/9/2018</a:t>
+              <a:t>12/10/2018</a:t>
             </a:fld>
             <a:endParaRPr lang="el-GR"/>
           </a:p>
@@ -838,7 +838,7 @@
           <a:p>
             <a:fld id="{F2853615-BFDE-46DE-814C-47EC6EF6D371}" type="datetimeFigureOut">
               <a:rPr lang="el-GR" smtClean="0"/>
-              <a:t>24/9/2018</a:t>
+              <a:t>12/10/2018</a:t>
             </a:fld>
             <a:endParaRPr lang="el-GR"/>
           </a:p>
@@ -977,7 +977,7 @@
           <a:p>
             <a:fld id="{F2853615-BFDE-46DE-814C-47EC6EF6D371}" type="datetimeFigureOut">
               <a:rPr lang="el-GR" smtClean="0"/>
-              <a:t>24/9/2018</a:t>
+              <a:t>12/10/2018</a:t>
             </a:fld>
             <a:endParaRPr lang="el-GR"/>
           </a:p>
@@ -1295,7 +1295,7 @@
           <a:p>
             <a:fld id="{F2853615-BFDE-46DE-814C-47EC6EF6D371}" type="datetimeFigureOut">
               <a:rPr lang="el-GR" smtClean="0"/>
-              <a:t>24/9/2018</a:t>
+              <a:t>12/10/2018</a:t>
             </a:fld>
             <a:endParaRPr lang="el-GR"/>
           </a:p>
@@ -1761,7 +1761,7 @@
           <a:p>
             <a:fld id="{F2853615-BFDE-46DE-814C-47EC6EF6D371}" type="datetimeFigureOut">
               <a:rPr lang="el-GR" smtClean="0"/>
-              <a:t>24/9/2018</a:t>
+              <a:t>12/10/2018</a:t>
             </a:fld>
             <a:endParaRPr lang="el-GR"/>
           </a:p>
@@ -1909,7 +1909,7 @@
           <a:p>
             <a:fld id="{F2853615-BFDE-46DE-814C-47EC6EF6D371}" type="datetimeFigureOut">
               <a:rPr lang="el-GR" smtClean="0"/>
-              <a:t>24/9/2018</a:t>
+              <a:t>12/10/2018</a:t>
             </a:fld>
             <a:endParaRPr lang="el-GR"/>
           </a:p>
@@ -1999,7 +1999,7 @@
           <a:p>
             <a:fld id="{F2853615-BFDE-46DE-814C-47EC6EF6D371}" type="datetimeFigureOut">
               <a:rPr lang="el-GR" smtClean="0"/>
-              <a:t>24/9/2018</a:t>
+              <a:t>12/10/2018</a:t>
             </a:fld>
             <a:endParaRPr lang="el-GR"/>
           </a:p>
@@ -2273,7 +2273,7 @@
           <a:p>
             <a:fld id="{F2853615-BFDE-46DE-814C-47EC6EF6D371}" type="datetimeFigureOut">
               <a:rPr lang="el-GR" smtClean="0"/>
-              <a:t>24/9/2018</a:t>
+              <a:t>12/10/2018</a:t>
             </a:fld>
             <a:endParaRPr lang="el-GR"/>
           </a:p>
@@ -2578,7 +2578,7 @@
           <a:p>
             <a:fld id="{F2853615-BFDE-46DE-814C-47EC6EF6D371}" type="datetimeFigureOut">
               <a:rPr lang="el-GR" smtClean="0"/>
-              <a:t>24/9/2018</a:t>
+              <a:t>12/10/2018</a:t>
             </a:fld>
             <a:endParaRPr lang="el-GR"/>
           </a:p>
@@ -2876,7 +2876,7 @@
           <a:p>
             <a:fld id="{F2853615-BFDE-46DE-814C-47EC6EF6D371}" type="datetimeFigureOut">
               <a:rPr lang="el-GR" smtClean="0"/>
-              <a:t>24/9/2018</a:t>
+              <a:t>12/10/2018</a:t>
             </a:fld>
             <a:endParaRPr lang="el-GR"/>
           </a:p>
@@ -3328,11 +3328,7 @@
             </a:br>
             <a:r>
               <a:rPr lang="en-US" sz="4800" dirty="0" smtClean="0"/>
-              <a:t>Feature </a:t>
-            </a:r>
-            <a:r>
-              <a:rPr lang="en-US" sz="4800" dirty="0" smtClean="0"/>
-              <a:t>Extraction</a:t>
+              <a:t>Feature Extraction</a:t>
             </a:r>
             <a:endParaRPr lang="el-GR" sz="4400" dirty="0"/>
           </a:p>
@@ -3450,9 +3446,16 @@
           <a:p>
             <a:r>
               <a:rPr lang="en-US" sz="2800" dirty="0" smtClean="0"/>
-              <a:t>Step 1: Center the data</a:t>
-            </a:r>
-            <a:endParaRPr lang="en-US" sz="2800" dirty="0" smtClean="0"/>
+              <a:t>Step 1: </a:t>
+            </a:r>
+            <a:r>
+              <a:rPr lang="en-US" sz="2800" dirty="0" smtClean="0"/>
+              <a:t>Scale </a:t>
+            </a:r>
+            <a:r>
+              <a:rPr lang="en-US" sz="2800" dirty="0" smtClean="0"/>
+              <a:t>the data</a:t>
+            </a:r>
           </a:p>
         </p:txBody>
       </p:sp>
@@ -3720,7 +3723,6 @@
               <a:rPr lang="en-US" dirty="0" smtClean="0"/>
               <a:t>Get eigenvalues and eigenvectors</a:t>
             </a:r>
-            <a:endParaRPr lang="en-US" dirty="0" smtClean="0"/>
           </a:p>
         </p:txBody>
       </p:sp>

</xml_diff>